<commit_message>
combine multiple R scripts into one
</commit_message>
<xml_diff>
--- a/RPackage_en.pptx
+++ b/RPackage_en.pptx
@@ -228,7 +228,7 @@
               <a:rPr lang="de-CH" smtClean="0">
                 <a:latin typeface="Arial" panose="020B0604020202020204" pitchFamily="34" charset="0"/>
               </a:rPr>
-              <a:t>07.02.2022</a:t>
+              <a:t>09.02.2022</a:t>
             </a:fld>
             <a:endParaRPr lang="de-CH" dirty="0">
               <a:latin typeface="Arial" panose="020B0604020202020204" pitchFamily="34" charset="0"/>
@@ -406,7 +406,7 @@
             <a:fld id="{5991B98F-1650-405D-9DF5-D564DF2E9405}" type="datetimeFigureOut">
               <a:rPr lang="de-CH" smtClean="0"/>
               <a:pPr/>
-              <a:t>07.02.2022</a:t>
+              <a:t>09.02.2022</a:t>
             </a:fld>
             <a:endParaRPr lang="de-CH" dirty="0"/>
           </a:p>
@@ -937,7 +937,7 @@
           <a:p>
             <a:fld id="{E740862B-F753-4A74-A9C3-E9DDA495171F}" type="datetime1">
               <a:rPr lang="de-CH" smtClean="0"/>
-              <a:t>07.02.2022</a:t>
+              <a:t>09.02.2022</a:t>
             </a:fld>
             <a:endParaRPr lang="fr-CH" dirty="0"/>
           </a:p>
@@ -1138,7 +1138,7 @@
           <a:p>
             <a:fld id="{322A823A-C061-4C09-A423-1C486B957565}" type="datetime1">
               <a:rPr lang="de-CH" smtClean="0"/>
-              <a:t>07.02.2022</a:t>
+              <a:t>09.02.2022</a:t>
             </a:fld>
             <a:endParaRPr lang="fr-CH" dirty="0"/>
           </a:p>
@@ -1339,7 +1339,7 @@
           <a:p>
             <a:fld id="{6F40CD7E-2D4A-4D7A-843D-6D90BA790C77}" type="datetime1">
               <a:rPr lang="de-CH" smtClean="0"/>
-              <a:t>07.02.2022</a:t>
+              <a:t>09.02.2022</a:t>
             </a:fld>
             <a:endParaRPr lang="fr-CH" dirty="0"/>
           </a:p>
@@ -1540,7 +1540,7 @@
           <a:p>
             <a:fld id="{1964E26F-0851-4BD7-828A-DDF163727273}" type="datetime1">
               <a:rPr lang="de-CH" smtClean="0"/>
-              <a:t>07.02.2022</a:t>
+              <a:t>09.02.2022</a:t>
             </a:fld>
             <a:endParaRPr lang="fr-CH" dirty="0"/>
           </a:p>
@@ -1741,7 +1741,7 @@
           <a:p>
             <a:fld id="{6C2D6A15-5615-4C46-908A-BBF3C061BF07}" type="datetime1">
               <a:rPr lang="de-CH" smtClean="0"/>
-              <a:t>07.02.2022</a:t>
+              <a:t>09.02.2022</a:t>
             </a:fld>
             <a:endParaRPr lang="fr-CH" dirty="0"/>
           </a:p>
@@ -1887,7 +1887,7 @@
           <a:p>
             <a:fld id="{7345CE87-CE41-420C-BFE3-A50DE9122969}" type="datetime1">
               <a:rPr lang="de-CH" smtClean="0"/>
-              <a:t>07.02.2022</a:t>
+              <a:t>09.02.2022</a:t>
             </a:fld>
             <a:endParaRPr lang="fr-CH" dirty="0"/>
           </a:p>
@@ -2043,7 +2043,7 @@
           <a:p>
             <a:fld id="{144741D9-BBCD-4A5E-8F75-DB38F8C9223A}" type="datetime1">
               <a:rPr lang="de-CH" smtClean="0"/>
-              <a:t>07.02.2022</a:t>
+              <a:t>09.02.2022</a:t>
             </a:fld>
             <a:endParaRPr lang="fr-CH" dirty="0"/>
           </a:p>
@@ -2230,7 +2230,7 @@
           <a:p>
             <a:fld id="{590323A2-A89B-4232-8144-E1B984358244}" type="datetime1">
               <a:rPr lang="de-CH" smtClean="0"/>
-              <a:t>07.02.2022</a:t>
+              <a:t>09.02.2022</a:t>
             </a:fld>
             <a:endParaRPr lang="fr-CH" dirty="0"/>
           </a:p>
@@ -2370,7 +2370,7 @@
           <a:p>
             <a:fld id="{10E6F3AA-70B5-4C81-B19F-9375D1896B4A}" type="datetime1">
               <a:rPr lang="de-CH" smtClean="0"/>
-              <a:t>07.02.2022</a:t>
+              <a:t>09.02.2022</a:t>
             </a:fld>
             <a:endParaRPr lang="fr-CH" dirty="0"/>
           </a:p>
@@ -2510,7 +2510,7 @@
           <a:p>
             <a:fld id="{4DACBA1C-6C88-462E-B4BF-9929FD547BFF}" type="datetime1">
               <a:rPr lang="de-CH" smtClean="0"/>
-              <a:t>07.02.2022</a:t>
+              <a:t>09.02.2022</a:t>
             </a:fld>
             <a:endParaRPr lang="fr-CH" dirty="0"/>
           </a:p>
@@ -2945,7 +2945,7 @@
           <a:p>
             <a:fld id="{BE2D5AED-D2E5-4683-BA53-CE031DFD36F7}" type="datetime1">
               <a:rPr lang="de-CH" smtClean="0"/>
-              <a:t>07.02.2022</a:t>
+              <a:t>09.02.2022</a:t>
             </a:fld>
             <a:endParaRPr lang="fr-CH" dirty="0"/>
           </a:p>
@@ -3243,7 +3243,7 @@
           <a:p>
             <a:fld id="{2901940B-835C-4E14-9765-B00BA93465B8}" type="datetime1">
               <a:rPr lang="de-CH" smtClean="0"/>
-              <a:t>07.02.2022</a:t>
+              <a:t>09.02.2022</a:t>
             </a:fld>
             <a:endParaRPr lang="fr-CH" dirty="0"/>
           </a:p>
@@ -3579,7 +3579,7 @@
           <a:p>
             <a:fld id="{0ED2030C-75A9-4FAF-B3FB-013DBBD37E56}" type="datetime1">
               <a:rPr lang="de-CH" smtClean="0"/>
-              <a:t>07.02.2022</a:t>
+              <a:t>09.02.2022</a:t>
             </a:fld>
             <a:endParaRPr lang="fr-CH" dirty="0"/>
           </a:p>
@@ -4091,7 +4091,7 @@
           <a:p>
             <a:fld id="{771DE1CA-CDE7-4CB5-8FF3-CFA7C49F3DAC}" type="datetime1">
               <a:rPr lang="de-CH" smtClean="0"/>
-              <a:t>07.02.2022</a:t>
+              <a:t>09.02.2022</a:t>
             </a:fld>
             <a:endParaRPr lang="fr-CH" dirty="0"/>
           </a:p>
@@ -4313,7 +4313,7 @@
           <a:p>
             <a:fld id="{610489CE-FBB6-480E-B489-CE91A0A4A37D}" type="datetime1">
               <a:rPr lang="de-CH" smtClean="0"/>
-              <a:t>07.02.2022</a:t>
+              <a:t>09.02.2022</a:t>
             </a:fld>
             <a:endParaRPr lang="fr-CH" dirty="0"/>
           </a:p>
@@ -4491,7 +4491,7 @@
           <a:p>
             <a:fld id="{647C40AA-CA50-40CE-9CC4-07C3161D2D94}" type="datetime1">
               <a:rPr lang="de-CH" smtClean="0"/>
-              <a:t>07.02.2022</a:t>
+              <a:t>09.02.2022</a:t>
             </a:fld>
             <a:endParaRPr lang="fr-CH" dirty="0"/>
           </a:p>
@@ -4750,7 +4750,7 @@
           <a:p>
             <a:fld id="{97951D55-766C-4073-B6D6-F844DD2AD6BD}" type="datetime1">
               <a:rPr lang="de-CH" smtClean="0"/>
-              <a:t>07.02.2022</a:t>
+              <a:t>09.02.2022</a:t>
             </a:fld>
             <a:endParaRPr lang="fr-CH" dirty="0"/>
           </a:p>
@@ -4898,7 +4898,7 @@
           <a:p>
             <a:fld id="{A494620C-7B72-43D0-9AB8-7532B2719D4E}" type="datetime1">
               <a:rPr lang="de-CH" smtClean="0"/>
-              <a:t>07.02.2022</a:t>
+              <a:t>09.02.2022</a:t>
             </a:fld>
             <a:endParaRPr lang="fr-CH" dirty="0"/>
           </a:p>
@@ -5040,7 +5040,7 @@
           <a:p>
             <a:fld id="{0C485A22-3884-4195-8C09-C1ADD9DB16DA}" type="datetime1">
               <a:rPr lang="de-CH" smtClean="0"/>
-              <a:t>07.02.2022</a:t>
+              <a:t>09.02.2022</a:t>
             </a:fld>
             <a:endParaRPr lang="fr-CH" dirty="0"/>
           </a:p>
@@ -5281,7 +5281,7 @@
           <a:p>
             <a:fld id="{E81CF062-5697-4CAB-A913-E646257F8F9E}" type="datetime1">
               <a:rPr lang="de-CH" smtClean="0"/>
-              <a:t>07.02.2022</a:t>
+              <a:t>09.02.2022</a:t>
             </a:fld>
             <a:endParaRPr lang="fr-CH" dirty="0"/>
           </a:p>
@@ -5657,7 +5657,7 @@
           <a:p>
             <a:fld id="{78FE72B2-31B8-4ABB-B926-99823DABB20B}" type="datetime1">
               <a:rPr lang="de-CH" smtClean="0"/>
-              <a:t>07.02.2022</a:t>
+              <a:t>09.02.2022</a:t>
             </a:fld>
             <a:endParaRPr lang="fr-CH" dirty="0"/>
           </a:p>
@@ -5902,7 +5902,7 @@
           <a:p>
             <a:fld id="{9B14CB66-76A4-4740-A994-08456E8DCAEB}" type="datetime1">
               <a:rPr lang="de-CH" smtClean="0"/>
-              <a:t>07.02.2022</a:t>
+              <a:t>09.02.2022</a:t>
             </a:fld>
             <a:endParaRPr lang="fr-CH" dirty="0"/>
           </a:p>
@@ -6171,7 +6171,7 @@
           <a:p>
             <a:fld id="{1DD2F9DE-E085-465A-AFCD-9143BC0CE701}" type="datetime1">
               <a:rPr lang="de-CH" smtClean="0"/>
-              <a:t>07.02.2022</a:t>
+              <a:t>09.02.2022</a:t>
             </a:fld>
             <a:endParaRPr lang="fr-CH" dirty="0"/>
           </a:p>
@@ -6402,7 +6402,7 @@
           <a:p>
             <a:fld id="{DE81F515-B529-4E53-B041-9174A301693D}" type="datetime1">
               <a:rPr lang="de-CH" smtClean="0"/>
-              <a:t>07.02.2022</a:t>
+              <a:t>09.02.2022</a:t>
             </a:fld>
             <a:endParaRPr lang="fr-CH" dirty="0"/>
           </a:p>
@@ -6679,7 +6679,7 @@
           <a:p>
             <a:fld id="{6766DAFF-4DD6-4136-BB56-356AC4CE71A7}" type="datetime1">
               <a:rPr lang="de-CH" smtClean="0"/>
-              <a:t>07.02.2022</a:t>
+              <a:t>09.02.2022</a:t>
             </a:fld>
             <a:endParaRPr lang="fr-CH" dirty="0"/>
           </a:p>
@@ -6936,7 +6936,7 @@
           <a:p>
             <a:fld id="{86B5E76D-0E3A-401B-B7FA-66C67C98CFE9}" type="datetime1">
               <a:rPr lang="de-CH" smtClean="0"/>
-              <a:t>07.02.2022</a:t>
+              <a:t>09.02.2022</a:t>
             </a:fld>
             <a:endParaRPr lang="fr-CH" dirty="0"/>
           </a:p>
@@ -7137,7 +7137,7 @@
           <a:p>
             <a:fld id="{EEAB6B76-9E8E-4349-8B67-30BA00A05EA6}" type="datetime1">
               <a:rPr lang="de-CH" smtClean="0"/>
-              <a:t>07.02.2022</a:t>
+              <a:t>09.02.2022</a:t>
             </a:fld>
             <a:endParaRPr lang="fr-CH" dirty="0"/>
           </a:p>
@@ -7402,7 +7402,7 @@
           <a:p>
             <a:fld id="{01FAA826-5F5E-4E1E-AAE4-E43658568A6E}" type="datetime1">
               <a:rPr lang="de-CH" smtClean="0"/>
-              <a:t>07.02.2022</a:t>
+              <a:t>09.02.2022</a:t>
             </a:fld>
             <a:endParaRPr lang="fr-CH" dirty="0"/>
           </a:p>
@@ -8108,8 +8108,8 @@
         </p:blipFill>
         <p:spPr>
           <a:xfrm>
-            <a:off x="767408" y="2636912"/>
-            <a:ext cx="5076825" cy="2905125"/>
+            <a:off x="1703512" y="2564904"/>
+            <a:ext cx="6291846" cy="3600400"/>
           </a:xfrm>
           <a:prstGeom prst="rect">
             <a:avLst/>
@@ -8164,7 +8164,7 @@
           <a:p>
             <a:fld id="{9968C99E-1E27-4D09-BCD4-A3391F8E8EE9}" type="datetime1">
               <a:rPr lang="de-CH" smtClean="0"/>
-              <a:t>07.02.2022</a:t>
+              <a:t>09.02.2022</a:t>
             </a:fld>
             <a:endParaRPr lang="fr-CH" dirty="0"/>
           </a:p>
@@ -8232,7 +8232,12 @@
             <p:ph idx="1"/>
           </p:nvPr>
         </p:nvSpPr>
-        <p:spPr/>
+        <p:spPr>
+          <a:xfrm>
+            <a:off x="542925" y="1273296"/>
+            <a:ext cx="6777212" cy="4532192"/>
+          </a:xfrm>
+        </p:spPr>
         <p:txBody>
           <a:bodyPr/>
           <a:lstStyle/>
@@ -8424,8 +8429,8 @@
         </p:nvSpPr>
         <p:spPr>
           <a:xfrm>
-            <a:off x="911424" y="2852936"/>
-            <a:ext cx="1368152" cy="255391"/>
+            <a:off x="1885937" y="2835285"/>
+            <a:ext cx="1451576" cy="255391"/>
           </a:xfrm>
           <a:prstGeom prst="rect">
             <a:avLst/>
@@ -8470,8 +8475,8 @@
         </p:nvSpPr>
         <p:spPr>
           <a:xfrm>
-            <a:off x="911424" y="4124140"/>
-            <a:ext cx="1368152" cy="255391"/>
+            <a:off x="1885937" y="4449473"/>
+            <a:ext cx="1451576" cy="255391"/>
           </a:xfrm>
           <a:prstGeom prst="rect">
             <a:avLst/>
@@ -8606,7 +8611,7 @@
           <a:p>
             <a:fld id="{4C38BF51-FD12-4780-9282-8B4B82423C53}" type="datetime1">
               <a:rPr lang="de-CH" smtClean="0"/>
-              <a:t>07.02.2022</a:t>
+              <a:t>09.02.2022</a:t>
             </a:fld>
             <a:endParaRPr lang="fr-CH" dirty="0"/>
           </a:p>
@@ -9434,7 +9439,7 @@
           <a:p>
             <a:fld id="{76AA5BC4-8BF6-4DDD-B3E1-1D2BF7222D22}" type="datetime1">
               <a:rPr lang="de-CH" smtClean="0"/>
-              <a:t>07.02.2022</a:t>
+              <a:t>09.02.2022</a:t>
             </a:fld>
             <a:endParaRPr lang="fr-CH" dirty="0"/>
           </a:p>
@@ -9786,7 +9791,7 @@
         <p:spPr>
           <a:xfrm>
             <a:off x="586297" y="3386138"/>
-            <a:ext cx="8048625" cy="2419350"/>
+            <a:ext cx="9006096" cy="2707158"/>
           </a:xfrm>
           <a:prstGeom prst="rect">
             <a:avLst/>
@@ -9853,6 +9858,36 @@
           </a:prstGeom>
         </p:spPr>
       </p:pic>
+      <p:pic>
+        <p:nvPicPr>
+          <p:cNvPr id="12" name="Grafik 11">
+            <a:extLst>
+              <a:ext uri="{FF2B5EF4-FFF2-40B4-BE49-F238E27FC236}">
+                <a16:creationId xmlns:a16="http://schemas.microsoft.com/office/drawing/2014/main" id="{33035CD4-5616-49C0-B38F-2B2578428F25}"/>
+              </a:ext>
+            </a:extLst>
+          </p:cNvPr>
+          <p:cNvPicPr>
+            <a:picLocks noChangeAspect="1"/>
+          </p:cNvPicPr>
+          <p:nvPr/>
+        </p:nvPicPr>
+        <p:blipFill>
+          <a:blip r:embed="rId3"/>
+          <a:stretch>
+            <a:fillRect/>
+          </a:stretch>
+        </p:blipFill>
+        <p:spPr>
+          <a:xfrm>
+            <a:off x="2079012" y="3328583"/>
+            <a:ext cx="1358970" cy="1358970"/>
+          </a:xfrm>
+          <a:prstGeom prst="rect">
+            <a:avLst/>
+          </a:prstGeom>
+        </p:spPr>
+      </p:pic>
       <p:sp>
         <p:nvSpPr>
           <p:cNvPr id="2" name="Title 1"/>
@@ -9917,7 +9952,7 @@
           <a:p>
             <a:fld id="{1AB4C5C6-AF87-45AC-AA88-6A0A0087A591}" type="datetime1">
               <a:rPr lang="de-CH" smtClean="0"/>
-              <a:t>07.02.2022</a:t>
+              <a:t>09.02.2022</a:t>
             </a:fld>
             <a:endParaRPr lang="fr-CH" dirty="0"/>
           </a:p>
@@ -10491,36 +10526,6 @@
           </a:p>
         </p:txBody>
       </p:sp>
-      <p:pic>
-        <p:nvPicPr>
-          <p:cNvPr id="15" name="Grafik 14">
-            <a:extLst>
-              <a:ext uri="{FF2B5EF4-FFF2-40B4-BE49-F238E27FC236}">
-                <a16:creationId xmlns:a16="http://schemas.microsoft.com/office/drawing/2014/main" id="{3D537F2E-8892-418B-8326-A1CAEBC30B26}"/>
-              </a:ext>
-            </a:extLst>
-          </p:cNvPr>
-          <p:cNvPicPr>
-            <a:picLocks noChangeAspect="1"/>
-          </p:cNvPicPr>
-          <p:nvPr/>
-        </p:nvPicPr>
-        <p:blipFill>
-          <a:blip r:embed="rId3"/>
-          <a:stretch>
-            <a:fillRect/>
-          </a:stretch>
-        </p:blipFill>
-        <p:spPr>
-          <a:xfrm>
-            <a:off x="2083912" y="3824130"/>
-            <a:ext cx="1781175" cy="1200150"/>
-          </a:xfrm>
-          <a:prstGeom prst="rect">
-            <a:avLst/>
-          </a:prstGeom>
-        </p:spPr>
-      </p:pic>
       <p:cxnSp>
         <p:nvCxnSpPr>
           <p:cNvPr id="17" name="Gerade Verbindung mit Pfeil 16">
@@ -10611,8 +10616,8 @@
         </p:nvCxnSpPr>
         <p:spPr>
           <a:xfrm>
-            <a:off x="2823079" y="4178126"/>
-            <a:ext cx="764372" cy="330994"/>
+            <a:off x="3182950" y="4120534"/>
+            <a:ext cx="404501" cy="244570"/>
           </a:xfrm>
           <a:prstGeom prst="straightConnector1">
             <a:avLst/>
@@ -10815,7 +10820,7 @@
           <a:p>
             <a:fld id="{F3F6CB59-E58D-41F2-8112-AD0E20BFAE57}" type="datetime1">
               <a:rPr lang="de-CH" smtClean="0"/>
-              <a:t>07.02.2022</a:t>
+              <a:t>09.02.2022</a:t>
             </a:fld>
             <a:endParaRPr lang="fr-CH" dirty="0"/>
           </a:p>
@@ -11126,8 +11131,50 @@
                 </a:solidFill>
                 <a:cs typeface="Courier New" panose="02070309020205020404" pitchFamily="49" charset="0"/>
               </a:rPr>
-              <a:t> 2</a:t>
-            </a:r>
+              <a:t> 2 (</a:t>
+            </a:r>
+            <a:r>
+              <a:rPr lang="de-CH" dirty="0" err="1">
+                <a:solidFill>
+                  <a:srgbClr val="C00000"/>
+                </a:solidFill>
+                <a:cs typeface="Courier New" panose="02070309020205020404" pitchFamily="49" charset="0"/>
+              </a:rPr>
+              <a:t>copy</a:t>
+            </a:r>
+            <a:r>
+              <a:rPr lang="de-CH" dirty="0">
+                <a:solidFill>
+                  <a:srgbClr val="C00000"/>
+                </a:solidFill>
+                <a:cs typeface="Courier New" panose="02070309020205020404" pitchFamily="49" charset="0"/>
+              </a:rPr>
+              <a:t> </a:t>
+            </a:r>
+            <a:r>
+              <a:rPr lang="de-CH" dirty="0" err="1">
+                <a:solidFill>
+                  <a:srgbClr val="C00000"/>
+                </a:solidFill>
+                <a:cs typeface="Courier New" panose="02070309020205020404" pitchFamily="49" charset="0"/>
+              </a:rPr>
+              <a:t>to</a:t>
+            </a:r>
+            <a:r>
+              <a:rPr lang="de-CH">
+                <a:solidFill>
+                  <a:srgbClr val="C00000"/>
+                </a:solidFill>
+                <a:cs typeface="Courier New" panose="02070309020205020404" pitchFamily="49" charset="0"/>
+              </a:rPr>
+              <a:t> R)</a:t>
+            </a:r>
+            <a:endParaRPr lang="de-CH" dirty="0">
+              <a:solidFill>
+                <a:srgbClr val="C00000"/>
+              </a:solidFill>
+              <a:cs typeface="Courier New" panose="02070309020205020404" pitchFamily="49" charset="0"/>
+            </a:endParaRPr>
           </a:p>
           <a:p>
             <a:pPr marL="0" indent="0">
@@ -11551,7 +11598,7 @@
           <a:p>
             <a:fld id="{5BFE5645-FFB5-47FD-B669-EE82B30CEDEC}" type="datetime1">
               <a:rPr lang="de-CH" smtClean="0"/>
-              <a:t>07.02.2022</a:t>
+              <a:t>09.02.2022</a:t>
             </a:fld>
             <a:endParaRPr lang="fr-CH" dirty="0"/>
           </a:p>
@@ -11962,31 +12009,43 @@
               <a:rPr lang="de-CH" dirty="0" err="1">
                 <a:cs typeface="Courier New" panose="02070309020205020404" pitchFamily="49" charset="0"/>
               </a:rPr>
-              <a:t>every</a:t>
+              <a:t>your</a:t>
             </a:r>
             <a:r>
               <a:rPr lang="de-CH" dirty="0">
                 <a:cs typeface="Courier New" panose="02070309020205020404" pitchFamily="49" charset="0"/>
               </a:rPr>
+              <a:t> R </a:t>
+            </a:r>
+            <a:r>
+              <a:rPr lang="de-CH" dirty="0" err="1">
+                <a:cs typeface="Courier New" panose="02070309020205020404" pitchFamily="49" charset="0"/>
+              </a:rPr>
+              <a:t>functions</a:t>
+            </a:r>
+            <a:r>
+              <a:rPr lang="de-CH" dirty="0">
+                <a:cs typeface="Courier New" panose="02070309020205020404" pitchFamily="49" charset="0"/>
+              </a:rPr>
               <a:t> </a:t>
             </a:r>
             <a:r>
               <a:rPr lang="de-CH" dirty="0" err="1">
                 <a:cs typeface="Courier New" panose="02070309020205020404" pitchFamily="49" charset="0"/>
               </a:rPr>
-              <a:t>important</a:t>
+              <a:t>into</a:t>
             </a:r>
             <a:r>
               <a:rPr lang="de-CH" dirty="0">
                 <a:cs typeface="Courier New" panose="02070309020205020404" pitchFamily="49" charset="0"/>
               </a:rPr>
-              <a:t> R </a:t>
+              <a:t> </a:t>
             </a:r>
             <a:r>
               <a:rPr lang="de-CH" dirty="0" err="1">
                 <a:cs typeface="Courier New" panose="02070309020205020404" pitchFamily="49" charset="0"/>
               </a:rPr>
-              <a:t>function</a:t>
+              <a:t>one</a:t>
             </a:r>
             <a:r>
               <a:rPr lang="de-CH" dirty="0">
@@ -11998,57 +12057,45 @@
               <a:rPr lang="de-CH" dirty="0" err="1">
                 <a:cs typeface="Courier New" panose="02070309020205020404" pitchFamily="49" charset="0"/>
               </a:rPr>
-              <a:t>into</a:t>
+              <a:t>or</a:t>
             </a:r>
             <a:r>
               <a:rPr lang="de-CH" dirty="0">
                 <a:cs typeface="Courier New" panose="02070309020205020404" pitchFamily="49" charset="0"/>
               </a:rPr>
+              <a:t> multiple R </a:t>
+            </a:r>
+            <a:r>
+              <a:rPr lang="de-CH" dirty="0" err="1">
+                <a:cs typeface="Courier New" panose="02070309020205020404" pitchFamily="49" charset="0"/>
+              </a:rPr>
+              <a:t>scripts</a:t>
+            </a:r>
+            <a:r>
+              <a:rPr lang="de-CH" dirty="0">
+                <a:cs typeface="Courier New" panose="02070309020205020404" pitchFamily="49" charset="0"/>
+              </a:rPr>
+              <a:t>.</a:t>
+            </a:r>
+          </a:p>
+          <a:p>
+            <a:r>
+              <a:rPr lang="de-CH" dirty="0" err="1">
+                <a:cs typeface="Courier New" panose="02070309020205020404" pitchFamily="49" charset="0"/>
+              </a:rPr>
+              <a:t>Document</a:t>
+            </a:r>
+            <a:r>
+              <a:rPr lang="de-CH" dirty="0">
+                <a:cs typeface="Courier New" panose="02070309020205020404" pitchFamily="49" charset="0"/>
+              </a:rPr>
               <a:t> </a:t>
             </a:r>
             <a:r>
               <a:rPr lang="de-CH" dirty="0" err="1">
                 <a:cs typeface="Courier New" panose="02070309020205020404" pitchFamily="49" charset="0"/>
               </a:rPr>
-              <a:t>its</a:t>
-            </a:r>
-            <a:r>
-              <a:rPr lang="de-CH" dirty="0">
-                <a:cs typeface="Courier New" panose="02070309020205020404" pitchFamily="49" charset="0"/>
-              </a:rPr>
-              <a:t> own R </a:t>
-            </a:r>
-            <a:r>
-              <a:rPr lang="de-CH" dirty="0" err="1">
-                <a:cs typeface="Courier New" panose="02070309020205020404" pitchFamily="49" charset="0"/>
-              </a:rPr>
-              <a:t>script</a:t>
-            </a:r>
-            <a:r>
-              <a:rPr lang="de-CH" dirty="0">
-                <a:cs typeface="Courier New" panose="02070309020205020404" pitchFamily="49" charset="0"/>
-              </a:rPr>
-              <a:t>.</a:t>
-            </a:r>
-          </a:p>
-          <a:p>
-            <a:r>
-              <a:rPr lang="de-CH" dirty="0" err="1">
-                <a:cs typeface="Courier New" panose="02070309020205020404" pitchFamily="49" charset="0"/>
-              </a:rPr>
-              <a:t>Document</a:t>
-            </a:r>
-            <a:r>
-              <a:rPr lang="de-CH" dirty="0">
-                <a:cs typeface="Courier New" panose="02070309020205020404" pitchFamily="49" charset="0"/>
-              </a:rPr>
-              <a:t> </a:t>
-            </a:r>
-            <a:r>
-              <a:rPr lang="de-CH" dirty="0" err="1">
-                <a:cs typeface="Courier New" panose="02070309020205020404" pitchFamily="49" charset="0"/>
-              </a:rPr>
-              <a:t>it</a:t>
+              <a:t>them</a:t>
             </a:r>
             <a:r>
               <a:rPr lang="de-CH" dirty="0">
@@ -12346,7 +12393,7 @@
           <a:p>
             <a:fld id="{AC5354E2-64B9-4772-9397-C2841773751B}" type="datetime1">
               <a:rPr lang="de-CH" smtClean="0"/>
-              <a:t>07.02.2022</a:t>
+              <a:t>09.02.2022</a:t>
             </a:fld>
             <a:endParaRPr lang="fr-CH" dirty="0"/>
           </a:p>
@@ -12544,7 +12591,7 @@
         <p:spPr>
           <a:xfrm>
             <a:off x="548221" y="3792314"/>
-            <a:ext cx="3090590" cy="1124860"/>
+            <a:ext cx="4577600" cy="811825"/>
           </a:xfrm>
           <a:prstGeom prst="rect">
             <a:avLst/>
@@ -12568,59 +12615,8 @@
                   <a:srgbClr val="C00000"/>
                 </a:solidFill>
               </a:rPr>
-              <a:t>Test </a:t>
-            </a:r>
-            <a:r>
-              <a:rPr lang="fr-CH" sz="3200" dirty="0" err="1">
-                <a:solidFill>
-                  <a:srgbClr val="C00000"/>
-                </a:solidFill>
-              </a:rPr>
-              <a:t>it!</a:t>
-            </a:r>
-            <a:endParaRPr lang="fr-CH" sz="3200" dirty="0">
-              <a:solidFill>
-                <a:srgbClr val="C00000"/>
-              </a:solidFill>
-            </a:endParaRPr>
-          </a:p>
-          <a:p>
-            <a:pPr>
-              <a:lnSpc>
-                <a:spcPct val="113000"/>
-              </a:lnSpc>
-            </a:pPr>
-            <a:r>
-              <a:rPr lang="fr-CH" sz="1800" dirty="0">
-                <a:solidFill>
-                  <a:srgbClr val="C00000"/>
-                </a:solidFill>
-              </a:rPr>
-              <a:t>(Google and Michael </a:t>
-            </a:r>
-            <a:r>
-              <a:rPr lang="fr-CH" sz="1800" dirty="0" err="1">
-                <a:solidFill>
-                  <a:srgbClr val="C00000"/>
-                </a:solidFill>
-              </a:rPr>
-              <a:t>will</a:t>
-            </a:r>
-            <a:r>
-              <a:rPr lang="fr-CH" sz="1800" dirty="0">
-                <a:solidFill>
-                  <a:srgbClr val="C00000"/>
-                </a:solidFill>
-              </a:rPr>
-              <a:t> help)</a:t>
-            </a:r>
-            <a:endParaRPr lang="de-CH" sz="1800" dirty="0">
-              <a:solidFill>
-                <a:srgbClr val="C00000"/>
-              </a:solidFill>
-              <a:latin typeface="Courier New" panose="02070309020205020404" pitchFamily="49" charset="0"/>
-              <a:cs typeface="Courier New" panose="02070309020205020404" pitchFamily="49" charset="0"/>
-            </a:endParaRPr>
+              <a:t>Test with your own code!</a:t>
+            </a:r>
           </a:p>
           <a:p>
             <a:pPr>
@@ -12646,8 +12642,8 @@
         </p:nvSpPr>
         <p:spPr>
           <a:xfrm>
-            <a:off x="407368" y="2923425"/>
-            <a:ext cx="6096000" cy="343620"/>
+            <a:off x="479071" y="2860372"/>
+            <a:ext cx="6096000" cy="594906"/>
           </a:xfrm>
           <a:prstGeom prst="rect">
             <a:avLst/>
@@ -12675,6 +12671,54 @@
               <a:t>https://github.com/mayer79/apero</a:t>
             </a:r>
             <a:endParaRPr lang="de-CH" dirty="0"/>
+          </a:p>
+          <a:p>
+            <a:r>
+              <a:rPr lang="en-US" dirty="0" err="1">
+                <a:latin typeface="Courier New" panose="02070309020205020404" pitchFamily="49" charset="0"/>
+                <a:cs typeface="Courier New" panose="02070309020205020404" pitchFamily="49" charset="0"/>
+              </a:rPr>
+              <a:t>devtools</a:t>
+            </a:r>
+            <a:r>
+              <a:rPr lang="en-US" dirty="0">
+                <a:latin typeface="Courier New" panose="02070309020205020404" pitchFamily="49" charset="0"/>
+                <a:cs typeface="Courier New" panose="02070309020205020404" pitchFamily="49" charset="0"/>
+              </a:rPr>
+              <a:t>::</a:t>
+            </a:r>
+            <a:r>
+              <a:rPr lang="en-US" dirty="0" err="1">
+                <a:latin typeface="Courier New" panose="02070309020205020404" pitchFamily="49" charset="0"/>
+                <a:cs typeface="Courier New" panose="02070309020205020404" pitchFamily="49" charset="0"/>
+              </a:rPr>
+              <a:t>install_github</a:t>
+            </a:r>
+            <a:r>
+              <a:rPr lang="en-US" dirty="0">
+                <a:latin typeface="Courier New" panose="02070309020205020404" pitchFamily="49" charset="0"/>
+                <a:cs typeface="Courier New" panose="02070309020205020404" pitchFamily="49" charset="0"/>
+              </a:rPr>
+              <a:t>("mayer79/</a:t>
+            </a:r>
+            <a:r>
+              <a:rPr lang="en-US" dirty="0" err="1">
+                <a:latin typeface="Courier New" panose="02070309020205020404" pitchFamily="49" charset="0"/>
+                <a:cs typeface="Courier New" panose="02070309020205020404" pitchFamily="49" charset="0"/>
+              </a:rPr>
+              <a:t>apero</a:t>
+            </a:r>
+            <a:r>
+              <a:rPr lang="en-US" dirty="0">
+                <a:latin typeface="Courier New" panose="02070309020205020404" pitchFamily="49" charset="0"/>
+                <a:cs typeface="Courier New" panose="02070309020205020404" pitchFamily="49" charset="0"/>
+              </a:rPr>
+              <a:t>")</a:t>
+            </a:r>
+            <a:endParaRPr lang="de-CH" dirty="0">
+              <a:latin typeface="Courier New" panose="02070309020205020404" pitchFamily="49" charset="0"/>
+              <a:cs typeface="Courier New" panose="02070309020205020404" pitchFamily="49" charset="0"/>
+            </a:endParaRPr>
           </a:p>
         </p:txBody>
       </p:sp>
@@ -12733,9 +12777,12 @@
           </a:p>
           <a:p>
             <a:r>
-              <a:rPr lang="de-CH" dirty="0"/>
+              <a:rPr lang="de-CH" dirty="0">
+                <a:hlinkClick r:id="rId3"/>
+              </a:rPr>
               <a:t>https://r-pkgs.org/</a:t>
             </a:r>
+            <a:endParaRPr lang="de-CH" dirty="0"/>
           </a:p>
         </p:txBody>
       </p:sp>
@@ -12754,7 +12801,7 @@
           <p:nvPr/>
         </p:nvPicPr>
         <p:blipFill>
-          <a:blip r:embed="rId3">
+          <a:blip r:embed="rId4">
             <a:extLst>
               <a:ext uri="{28A0092B-C50C-407E-A947-70E740481C1C}">
                 <a14:useLocalDpi xmlns:a14="http://schemas.microsoft.com/office/drawing/2010/main" val="0"/>

</xml_diff>

<commit_message>
small changes to comments and slides
</commit_message>
<xml_diff>
--- a/RPackage_en.pptx
+++ b/RPackage_en.pptx
@@ -228,7 +228,7 @@
               <a:rPr lang="de-CH" smtClean="0">
                 <a:latin typeface="Arial" panose="020B0604020202020204" pitchFamily="34" charset="0"/>
               </a:rPr>
-              <a:t>11.02.2022</a:t>
+              <a:t>20.02.2022</a:t>
             </a:fld>
             <a:endParaRPr lang="de-CH" dirty="0">
               <a:latin typeface="Arial" panose="020B0604020202020204" pitchFamily="34" charset="0"/>
@@ -406,7 +406,7 @@
             <a:fld id="{5991B98F-1650-405D-9DF5-D564DF2E9405}" type="datetimeFigureOut">
               <a:rPr lang="de-CH" smtClean="0"/>
               <a:pPr/>
-              <a:t>11.02.2022</a:t>
+              <a:t>20.02.2022</a:t>
             </a:fld>
             <a:endParaRPr lang="de-CH" dirty="0"/>
           </a:p>
@@ -937,7 +937,7 @@
           <a:p>
             <a:fld id="{E740862B-F753-4A74-A9C3-E9DDA495171F}" type="datetime1">
               <a:rPr lang="de-CH" smtClean="0"/>
-              <a:t>11.02.2022</a:t>
+              <a:t>20.02.2022</a:t>
             </a:fld>
             <a:endParaRPr lang="fr-CH" dirty="0"/>
           </a:p>
@@ -1138,7 +1138,7 @@
           <a:p>
             <a:fld id="{322A823A-C061-4C09-A423-1C486B957565}" type="datetime1">
               <a:rPr lang="de-CH" smtClean="0"/>
-              <a:t>11.02.2022</a:t>
+              <a:t>20.02.2022</a:t>
             </a:fld>
             <a:endParaRPr lang="fr-CH" dirty="0"/>
           </a:p>
@@ -1339,7 +1339,7 @@
           <a:p>
             <a:fld id="{6F40CD7E-2D4A-4D7A-843D-6D90BA790C77}" type="datetime1">
               <a:rPr lang="de-CH" smtClean="0"/>
-              <a:t>11.02.2022</a:t>
+              <a:t>20.02.2022</a:t>
             </a:fld>
             <a:endParaRPr lang="fr-CH" dirty="0"/>
           </a:p>
@@ -1540,7 +1540,7 @@
           <a:p>
             <a:fld id="{1964E26F-0851-4BD7-828A-DDF163727273}" type="datetime1">
               <a:rPr lang="de-CH" smtClean="0"/>
-              <a:t>11.02.2022</a:t>
+              <a:t>20.02.2022</a:t>
             </a:fld>
             <a:endParaRPr lang="fr-CH" dirty="0"/>
           </a:p>
@@ -1741,7 +1741,7 @@
           <a:p>
             <a:fld id="{6C2D6A15-5615-4C46-908A-BBF3C061BF07}" type="datetime1">
               <a:rPr lang="de-CH" smtClean="0"/>
-              <a:t>11.02.2022</a:t>
+              <a:t>20.02.2022</a:t>
             </a:fld>
             <a:endParaRPr lang="fr-CH" dirty="0"/>
           </a:p>
@@ -1887,7 +1887,7 @@
           <a:p>
             <a:fld id="{7345CE87-CE41-420C-BFE3-A50DE9122969}" type="datetime1">
               <a:rPr lang="de-CH" smtClean="0"/>
-              <a:t>11.02.2022</a:t>
+              <a:t>20.02.2022</a:t>
             </a:fld>
             <a:endParaRPr lang="fr-CH" dirty="0"/>
           </a:p>
@@ -2043,7 +2043,7 @@
           <a:p>
             <a:fld id="{144741D9-BBCD-4A5E-8F75-DB38F8C9223A}" type="datetime1">
               <a:rPr lang="de-CH" smtClean="0"/>
-              <a:t>11.02.2022</a:t>
+              <a:t>20.02.2022</a:t>
             </a:fld>
             <a:endParaRPr lang="fr-CH" dirty="0"/>
           </a:p>
@@ -2230,7 +2230,7 @@
           <a:p>
             <a:fld id="{590323A2-A89B-4232-8144-E1B984358244}" type="datetime1">
               <a:rPr lang="de-CH" smtClean="0"/>
-              <a:t>11.02.2022</a:t>
+              <a:t>20.02.2022</a:t>
             </a:fld>
             <a:endParaRPr lang="fr-CH" dirty="0"/>
           </a:p>
@@ -2370,7 +2370,7 @@
           <a:p>
             <a:fld id="{10E6F3AA-70B5-4C81-B19F-9375D1896B4A}" type="datetime1">
               <a:rPr lang="de-CH" smtClean="0"/>
-              <a:t>11.02.2022</a:t>
+              <a:t>20.02.2022</a:t>
             </a:fld>
             <a:endParaRPr lang="fr-CH" dirty="0"/>
           </a:p>
@@ -2510,7 +2510,7 @@
           <a:p>
             <a:fld id="{4DACBA1C-6C88-462E-B4BF-9929FD547BFF}" type="datetime1">
               <a:rPr lang="de-CH" smtClean="0"/>
-              <a:t>11.02.2022</a:t>
+              <a:t>20.02.2022</a:t>
             </a:fld>
             <a:endParaRPr lang="fr-CH" dirty="0"/>
           </a:p>
@@ -2945,7 +2945,7 @@
           <a:p>
             <a:fld id="{BE2D5AED-D2E5-4683-BA53-CE031DFD36F7}" type="datetime1">
               <a:rPr lang="de-CH" smtClean="0"/>
-              <a:t>11.02.2022</a:t>
+              <a:t>20.02.2022</a:t>
             </a:fld>
             <a:endParaRPr lang="fr-CH" dirty="0"/>
           </a:p>
@@ -3243,7 +3243,7 @@
           <a:p>
             <a:fld id="{2901940B-835C-4E14-9765-B00BA93465B8}" type="datetime1">
               <a:rPr lang="de-CH" smtClean="0"/>
-              <a:t>11.02.2022</a:t>
+              <a:t>20.02.2022</a:t>
             </a:fld>
             <a:endParaRPr lang="fr-CH" dirty="0"/>
           </a:p>
@@ -3579,7 +3579,7 @@
           <a:p>
             <a:fld id="{0ED2030C-75A9-4FAF-B3FB-013DBBD37E56}" type="datetime1">
               <a:rPr lang="de-CH" smtClean="0"/>
-              <a:t>11.02.2022</a:t>
+              <a:t>20.02.2022</a:t>
             </a:fld>
             <a:endParaRPr lang="fr-CH" dirty="0"/>
           </a:p>
@@ -4091,7 +4091,7 @@
           <a:p>
             <a:fld id="{771DE1CA-CDE7-4CB5-8FF3-CFA7C49F3DAC}" type="datetime1">
               <a:rPr lang="de-CH" smtClean="0"/>
-              <a:t>11.02.2022</a:t>
+              <a:t>20.02.2022</a:t>
             </a:fld>
             <a:endParaRPr lang="fr-CH" dirty="0"/>
           </a:p>
@@ -4313,7 +4313,7 @@
           <a:p>
             <a:fld id="{610489CE-FBB6-480E-B489-CE91A0A4A37D}" type="datetime1">
               <a:rPr lang="de-CH" smtClean="0"/>
-              <a:t>11.02.2022</a:t>
+              <a:t>20.02.2022</a:t>
             </a:fld>
             <a:endParaRPr lang="fr-CH" dirty="0"/>
           </a:p>
@@ -4491,7 +4491,7 @@
           <a:p>
             <a:fld id="{647C40AA-CA50-40CE-9CC4-07C3161D2D94}" type="datetime1">
               <a:rPr lang="de-CH" smtClean="0"/>
-              <a:t>11.02.2022</a:t>
+              <a:t>20.02.2022</a:t>
             </a:fld>
             <a:endParaRPr lang="fr-CH" dirty="0"/>
           </a:p>
@@ -4750,7 +4750,7 @@
           <a:p>
             <a:fld id="{97951D55-766C-4073-B6D6-F844DD2AD6BD}" type="datetime1">
               <a:rPr lang="de-CH" smtClean="0"/>
-              <a:t>11.02.2022</a:t>
+              <a:t>20.02.2022</a:t>
             </a:fld>
             <a:endParaRPr lang="fr-CH" dirty="0"/>
           </a:p>
@@ -4898,7 +4898,7 @@
           <a:p>
             <a:fld id="{A494620C-7B72-43D0-9AB8-7532B2719D4E}" type="datetime1">
               <a:rPr lang="de-CH" smtClean="0"/>
-              <a:t>11.02.2022</a:t>
+              <a:t>20.02.2022</a:t>
             </a:fld>
             <a:endParaRPr lang="fr-CH" dirty="0"/>
           </a:p>
@@ -5040,7 +5040,7 @@
           <a:p>
             <a:fld id="{0C485A22-3884-4195-8C09-C1ADD9DB16DA}" type="datetime1">
               <a:rPr lang="de-CH" smtClean="0"/>
-              <a:t>11.02.2022</a:t>
+              <a:t>20.02.2022</a:t>
             </a:fld>
             <a:endParaRPr lang="fr-CH" dirty="0"/>
           </a:p>
@@ -5281,7 +5281,7 @@
           <a:p>
             <a:fld id="{E81CF062-5697-4CAB-A913-E646257F8F9E}" type="datetime1">
               <a:rPr lang="de-CH" smtClean="0"/>
-              <a:t>11.02.2022</a:t>
+              <a:t>20.02.2022</a:t>
             </a:fld>
             <a:endParaRPr lang="fr-CH" dirty="0"/>
           </a:p>
@@ -5657,7 +5657,7 @@
           <a:p>
             <a:fld id="{78FE72B2-31B8-4ABB-B926-99823DABB20B}" type="datetime1">
               <a:rPr lang="de-CH" smtClean="0"/>
-              <a:t>11.02.2022</a:t>
+              <a:t>20.02.2022</a:t>
             </a:fld>
             <a:endParaRPr lang="fr-CH" dirty="0"/>
           </a:p>
@@ -5902,7 +5902,7 @@
           <a:p>
             <a:fld id="{9B14CB66-76A4-4740-A994-08456E8DCAEB}" type="datetime1">
               <a:rPr lang="de-CH" smtClean="0"/>
-              <a:t>11.02.2022</a:t>
+              <a:t>20.02.2022</a:t>
             </a:fld>
             <a:endParaRPr lang="fr-CH" dirty="0"/>
           </a:p>
@@ -6171,7 +6171,7 @@
           <a:p>
             <a:fld id="{1DD2F9DE-E085-465A-AFCD-9143BC0CE701}" type="datetime1">
               <a:rPr lang="de-CH" smtClean="0"/>
-              <a:t>11.02.2022</a:t>
+              <a:t>20.02.2022</a:t>
             </a:fld>
             <a:endParaRPr lang="fr-CH" dirty="0"/>
           </a:p>
@@ -6402,7 +6402,7 @@
           <a:p>
             <a:fld id="{DE81F515-B529-4E53-B041-9174A301693D}" type="datetime1">
               <a:rPr lang="de-CH" smtClean="0"/>
-              <a:t>11.02.2022</a:t>
+              <a:t>20.02.2022</a:t>
             </a:fld>
             <a:endParaRPr lang="fr-CH" dirty="0"/>
           </a:p>
@@ -6679,7 +6679,7 @@
           <a:p>
             <a:fld id="{6766DAFF-4DD6-4136-BB56-356AC4CE71A7}" type="datetime1">
               <a:rPr lang="de-CH" smtClean="0"/>
-              <a:t>11.02.2022</a:t>
+              <a:t>20.02.2022</a:t>
             </a:fld>
             <a:endParaRPr lang="fr-CH" dirty="0"/>
           </a:p>
@@ -6936,7 +6936,7 @@
           <a:p>
             <a:fld id="{86B5E76D-0E3A-401B-B7FA-66C67C98CFE9}" type="datetime1">
               <a:rPr lang="de-CH" smtClean="0"/>
-              <a:t>11.02.2022</a:t>
+              <a:t>20.02.2022</a:t>
             </a:fld>
             <a:endParaRPr lang="fr-CH" dirty="0"/>
           </a:p>
@@ -7137,7 +7137,7 @@
           <a:p>
             <a:fld id="{EEAB6B76-9E8E-4349-8B67-30BA00A05EA6}" type="datetime1">
               <a:rPr lang="de-CH" smtClean="0"/>
-              <a:t>11.02.2022</a:t>
+              <a:t>20.02.2022</a:t>
             </a:fld>
             <a:endParaRPr lang="fr-CH" dirty="0"/>
           </a:p>
@@ -7402,7 +7402,7 @@
           <a:p>
             <a:fld id="{01FAA826-5F5E-4E1E-AAE4-E43658568A6E}" type="datetime1">
               <a:rPr lang="de-CH" smtClean="0"/>
-              <a:t>11.02.2022</a:t>
+              <a:t>20.02.2022</a:t>
             </a:fld>
             <a:endParaRPr lang="fr-CH" dirty="0"/>
           </a:p>
@@ -8134,7 +8134,7 @@
           <a:p>
             <a:fld id="{9968C99E-1E27-4D09-BCD4-A3391F8E8EE9}" type="datetime1">
               <a:rPr lang="de-CH" smtClean="0"/>
-              <a:t>11.02.2022</a:t>
+              <a:t>20.02.2022</a:t>
             </a:fld>
             <a:endParaRPr lang="fr-CH" dirty="0"/>
           </a:p>
@@ -9244,7 +9244,7 @@
           <a:p>
             <a:fld id="{4C38BF51-FD12-4780-9282-8B4B82423C53}" type="datetime1">
               <a:rPr lang="de-CH" smtClean="0"/>
-              <a:t>11.02.2022</a:t>
+              <a:t>20.02.2022</a:t>
             </a:fld>
             <a:endParaRPr lang="fr-CH" dirty="0"/>
           </a:p>
@@ -10148,7 +10148,7 @@
           <a:p>
             <a:fld id="{76AA5BC4-8BF6-4DDD-B3E1-1D2BF7222D22}" type="datetime1">
               <a:rPr lang="de-CH" smtClean="0"/>
-              <a:t>11.02.2022</a:t>
+              <a:t>20.02.2022</a:t>
             </a:fld>
             <a:endParaRPr lang="fr-CH" dirty="0"/>
           </a:p>
@@ -11905,7 +11905,7 @@
           <a:p>
             <a:fld id="{1AB4C5C6-AF87-45AC-AA88-6A0A0087A591}" type="datetime1">
               <a:rPr lang="de-CH" smtClean="0"/>
-              <a:t>11.02.2022</a:t>
+              <a:t>20.02.2022</a:t>
             </a:fld>
             <a:endParaRPr lang="fr-CH" dirty="0"/>
           </a:p>
@@ -12861,7 +12861,7 @@
           <a:p>
             <a:fld id="{F3F6CB59-E58D-41F2-8112-AD0E20BFAE57}" type="datetime1">
               <a:rPr lang="de-CH" smtClean="0"/>
-              <a:t>11.02.2022</a:t>
+              <a:t>20.02.2022</a:t>
             </a:fld>
             <a:endParaRPr lang="fr-CH" dirty="0"/>
           </a:p>
@@ -13687,7 +13687,7 @@
           <a:p>
             <a:fld id="{5BFE5645-FFB5-47FD-B669-EE82B30CEDEC}" type="datetime1">
               <a:rPr lang="de-CH" smtClean="0"/>
-              <a:t>11.02.2022</a:t>
+              <a:t>20.02.2022</a:t>
             </a:fld>
             <a:endParaRPr lang="fr-CH" dirty="0"/>
           </a:p>
@@ -14517,7 +14517,7 @@
           <a:p>
             <a:fld id="{AC5354E2-64B9-4772-9397-C2841773751B}" type="datetime1">
               <a:rPr lang="de-CH" smtClean="0"/>
-              <a:t>11.02.2022</a:t>
+              <a:t>20.02.2022</a:t>
             </a:fld>
             <a:endParaRPr lang="fr-CH" dirty="0"/>
           </a:p>
@@ -14585,7 +14585,12 @@
             <p:ph idx="1"/>
           </p:nvPr>
         </p:nvSpPr>
-        <p:spPr/>
+        <p:spPr>
+          <a:xfrm>
+            <a:off x="542925" y="1412776"/>
+            <a:ext cx="5553075" cy="4392712"/>
+          </a:xfrm>
+        </p:spPr>
         <p:txBody>
           <a:bodyPr>
             <a:normAutofit/>
@@ -14615,6 +14620,8 @@
               <a:rPr lang="de-CH" dirty="0"/>
               <a:t>, </a:t>
             </a:r>
+          </a:p>
+          <a:p>
             <a:r>
               <a:rPr lang="de-CH" dirty="0" err="1"/>
               <a:t>never</a:t>
@@ -14635,68 +14642,80 @@
               <a:rPr lang="de-CH" dirty="0" err="1"/>
               <a:t>use</a:t>
             </a:r>
+            <a:r>
+              <a:rPr lang="de-CH" dirty="0"/>
+              <a:t> </a:t>
+            </a:r>
+            <a:r>
+              <a:rPr lang="de-CH" dirty="0">
+                <a:latin typeface="Courier New" panose="02070309020205020404" pitchFamily="49" charset="0"/>
+                <a:cs typeface="Courier New" panose="02070309020205020404" pitchFamily="49" charset="0"/>
+              </a:rPr>
+              <a:t>source(), </a:t>
+            </a:r>
+            <a:r>
+              <a:rPr lang="de-CH" dirty="0" err="1">
+                <a:latin typeface="Courier New" panose="02070309020205020404" pitchFamily="49" charset="0"/>
+                <a:cs typeface="Courier New" panose="02070309020205020404" pitchFamily="49" charset="0"/>
+              </a:rPr>
+              <a:t>setwd</a:t>
+            </a:r>
+            <a:r>
+              <a:rPr lang="de-CH" dirty="0">
+                <a:latin typeface="Courier New" panose="02070309020205020404" pitchFamily="49" charset="0"/>
+                <a:cs typeface="Courier New" panose="02070309020205020404" pitchFamily="49" charset="0"/>
+              </a:rPr>
+              <a:t>(),</a:t>
+            </a:r>
+            <a:br>
+              <a:rPr lang="de-CH" dirty="0">
+                <a:latin typeface="Courier New" panose="02070309020205020404" pitchFamily="49" charset="0"/>
+                <a:cs typeface="Courier New" panose="02070309020205020404" pitchFamily="49" charset="0"/>
+              </a:rPr>
+            </a:br>
+            <a:r>
+              <a:rPr lang="de-CH" dirty="0" err="1">
+                <a:latin typeface="Courier New" panose="02070309020205020404" pitchFamily="49" charset="0"/>
+                <a:cs typeface="Courier New" panose="02070309020205020404" pitchFamily="49" charset="0"/>
+              </a:rPr>
+              <a:t>library</a:t>
+            </a:r>
+            <a:r>
+              <a:rPr lang="de-CH" dirty="0">
+                <a:latin typeface="Courier New" panose="02070309020205020404" pitchFamily="49" charset="0"/>
+                <a:cs typeface="Courier New" panose="02070309020205020404" pitchFamily="49" charset="0"/>
+              </a:rPr>
+              <a:t>(), </a:t>
+            </a:r>
+            <a:r>
+              <a:rPr lang="de-CH" dirty="0" err="1">
+                <a:latin typeface="Courier New" panose="02070309020205020404" pitchFamily="49" charset="0"/>
+                <a:cs typeface="Courier New" panose="02070309020205020404" pitchFamily="49" charset="0"/>
+              </a:rPr>
+              <a:t>require</a:t>
+            </a:r>
+            <a:r>
+              <a:rPr lang="de-CH" dirty="0">
+                <a:latin typeface="Courier New" panose="02070309020205020404" pitchFamily="49" charset="0"/>
+                <a:cs typeface="Courier New" panose="02070309020205020404" pitchFamily="49" charset="0"/>
+              </a:rPr>
+              <a:t>()</a:t>
+            </a:r>
+          </a:p>
+          <a:p>
+            <a:r>
+              <a:rPr lang="de-CH" dirty="0" err="1"/>
+              <a:t>use</a:t>
+            </a:r>
+            <a:r>
+              <a:rPr lang="de-CH" dirty="0"/>
+              <a:t> defensive </a:t>
+            </a:r>
+            <a:r>
+              <a:rPr lang="de-CH" dirty="0" err="1"/>
+              <a:t>programming</a:t>
+            </a:r>
             <a:endParaRPr lang="de-CH" dirty="0"/>
-          </a:p>
-          <a:p>
-            <a:r>
-              <a:rPr lang="de-CH" dirty="0">
-                <a:latin typeface="Courier New" panose="02070309020205020404" pitchFamily="49" charset="0"/>
-                <a:cs typeface="Courier New" panose="02070309020205020404" pitchFamily="49" charset="0"/>
-              </a:rPr>
-              <a:t>source()</a:t>
-            </a:r>
-          </a:p>
-          <a:p>
-            <a:r>
-              <a:rPr lang="de-CH" dirty="0" err="1">
-                <a:latin typeface="Courier New" panose="02070309020205020404" pitchFamily="49" charset="0"/>
-                <a:cs typeface="Courier New" panose="02070309020205020404" pitchFamily="49" charset="0"/>
-              </a:rPr>
-              <a:t>library</a:t>
-            </a:r>
-            <a:r>
-              <a:rPr lang="de-CH" dirty="0">
-                <a:latin typeface="Courier New" panose="02070309020205020404" pitchFamily="49" charset="0"/>
-                <a:cs typeface="Courier New" panose="02070309020205020404" pitchFamily="49" charset="0"/>
-              </a:rPr>
-              <a:t>(), </a:t>
-            </a:r>
-            <a:r>
-              <a:rPr lang="de-CH" dirty="0" err="1">
-                <a:latin typeface="Courier New" panose="02070309020205020404" pitchFamily="49" charset="0"/>
-                <a:cs typeface="Courier New" panose="02070309020205020404" pitchFamily="49" charset="0"/>
-              </a:rPr>
-              <a:t>require</a:t>
-            </a:r>
-            <a:r>
-              <a:rPr lang="de-CH" dirty="0">
-                <a:latin typeface="Courier New" panose="02070309020205020404" pitchFamily="49" charset="0"/>
-                <a:cs typeface="Courier New" panose="02070309020205020404" pitchFamily="49" charset="0"/>
-              </a:rPr>
-              <a:t>()</a:t>
-            </a:r>
-          </a:p>
-          <a:p>
-            <a:r>
-              <a:rPr lang="de-CH" dirty="0" err="1">
-                <a:latin typeface="Courier New" panose="02070309020205020404" pitchFamily="49" charset="0"/>
-                <a:cs typeface="Courier New" panose="02070309020205020404" pitchFamily="49" charset="0"/>
-              </a:rPr>
-              <a:t>setwd</a:t>
-            </a:r>
-            <a:r>
-              <a:rPr lang="de-CH" dirty="0">
-                <a:latin typeface="Courier New" panose="02070309020205020404" pitchFamily="49" charset="0"/>
-                <a:cs typeface="Courier New" panose="02070309020205020404" pitchFamily="49" charset="0"/>
-              </a:rPr>
-              <a:t>()</a:t>
-            </a:r>
-          </a:p>
-          <a:p>
-            <a:endParaRPr lang="de-CH" dirty="0">
-              <a:latin typeface="Courier New" panose="02070309020205020404" pitchFamily="49" charset="0"/>
-              <a:cs typeface="Courier New" panose="02070309020205020404" pitchFamily="49" charset="0"/>
-            </a:endParaRPr>
           </a:p>
         </p:txBody>
       </p:sp>

</xml_diff>

<commit_message>
small improvement of docu
</commit_message>
<xml_diff>
--- a/RPackage_en.pptx
+++ b/RPackage_en.pptx
@@ -228,7 +228,7 @@
               <a:rPr lang="de-CH" smtClean="0">
                 <a:latin typeface="Arial" panose="020B0604020202020204" pitchFamily="34" charset="0"/>
               </a:rPr>
-              <a:t>20.02.2022</a:t>
+              <a:t>08.08.2022</a:t>
             </a:fld>
             <a:endParaRPr lang="de-CH" dirty="0">
               <a:latin typeface="Arial" panose="020B0604020202020204" pitchFamily="34" charset="0"/>
@@ -406,7 +406,7 @@
             <a:fld id="{5991B98F-1650-405D-9DF5-D564DF2E9405}" type="datetimeFigureOut">
               <a:rPr lang="de-CH" smtClean="0"/>
               <a:pPr/>
-              <a:t>20.02.2022</a:t>
+              <a:t>08.08.2022</a:t>
             </a:fld>
             <a:endParaRPr lang="de-CH" dirty="0"/>
           </a:p>
@@ -937,7 +937,7 @@
           <a:p>
             <a:fld id="{E740862B-F753-4A74-A9C3-E9DDA495171F}" type="datetime1">
               <a:rPr lang="de-CH" smtClean="0"/>
-              <a:t>20.02.2022</a:t>
+              <a:t>08.08.2022</a:t>
             </a:fld>
             <a:endParaRPr lang="fr-CH" dirty="0"/>
           </a:p>
@@ -1138,7 +1138,7 @@
           <a:p>
             <a:fld id="{322A823A-C061-4C09-A423-1C486B957565}" type="datetime1">
               <a:rPr lang="de-CH" smtClean="0"/>
-              <a:t>20.02.2022</a:t>
+              <a:t>08.08.2022</a:t>
             </a:fld>
             <a:endParaRPr lang="fr-CH" dirty="0"/>
           </a:p>
@@ -1339,7 +1339,7 @@
           <a:p>
             <a:fld id="{6F40CD7E-2D4A-4D7A-843D-6D90BA790C77}" type="datetime1">
               <a:rPr lang="de-CH" smtClean="0"/>
-              <a:t>20.02.2022</a:t>
+              <a:t>08.08.2022</a:t>
             </a:fld>
             <a:endParaRPr lang="fr-CH" dirty="0"/>
           </a:p>
@@ -1540,7 +1540,7 @@
           <a:p>
             <a:fld id="{1964E26F-0851-4BD7-828A-DDF163727273}" type="datetime1">
               <a:rPr lang="de-CH" smtClean="0"/>
-              <a:t>20.02.2022</a:t>
+              <a:t>08.08.2022</a:t>
             </a:fld>
             <a:endParaRPr lang="fr-CH" dirty="0"/>
           </a:p>
@@ -1741,7 +1741,7 @@
           <a:p>
             <a:fld id="{6C2D6A15-5615-4C46-908A-BBF3C061BF07}" type="datetime1">
               <a:rPr lang="de-CH" smtClean="0"/>
-              <a:t>20.02.2022</a:t>
+              <a:t>08.08.2022</a:t>
             </a:fld>
             <a:endParaRPr lang="fr-CH" dirty="0"/>
           </a:p>
@@ -1887,7 +1887,7 @@
           <a:p>
             <a:fld id="{7345CE87-CE41-420C-BFE3-A50DE9122969}" type="datetime1">
               <a:rPr lang="de-CH" smtClean="0"/>
-              <a:t>20.02.2022</a:t>
+              <a:t>08.08.2022</a:t>
             </a:fld>
             <a:endParaRPr lang="fr-CH" dirty="0"/>
           </a:p>
@@ -2043,7 +2043,7 @@
           <a:p>
             <a:fld id="{144741D9-BBCD-4A5E-8F75-DB38F8C9223A}" type="datetime1">
               <a:rPr lang="de-CH" smtClean="0"/>
-              <a:t>20.02.2022</a:t>
+              <a:t>08.08.2022</a:t>
             </a:fld>
             <a:endParaRPr lang="fr-CH" dirty="0"/>
           </a:p>
@@ -2230,7 +2230,7 @@
           <a:p>
             <a:fld id="{590323A2-A89B-4232-8144-E1B984358244}" type="datetime1">
               <a:rPr lang="de-CH" smtClean="0"/>
-              <a:t>20.02.2022</a:t>
+              <a:t>08.08.2022</a:t>
             </a:fld>
             <a:endParaRPr lang="fr-CH" dirty="0"/>
           </a:p>
@@ -2370,7 +2370,7 @@
           <a:p>
             <a:fld id="{10E6F3AA-70B5-4C81-B19F-9375D1896B4A}" type="datetime1">
               <a:rPr lang="de-CH" smtClean="0"/>
-              <a:t>20.02.2022</a:t>
+              <a:t>08.08.2022</a:t>
             </a:fld>
             <a:endParaRPr lang="fr-CH" dirty="0"/>
           </a:p>
@@ -2510,7 +2510,7 @@
           <a:p>
             <a:fld id="{4DACBA1C-6C88-462E-B4BF-9929FD547BFF}" type="datetime1">
               <a:rPr lang="de-CH" smtClean="0"/>
-              <a:t>20.02.2022</a:t>
+              <a:t>08.08.2022</a:t>
             </a:fld>
             <a:endParaRPr lang="fr-CH" dirty="0"/>
           </a:p>
@@ -2945,7 +2945,7 @@
           <a:p>
             <a:fld id="{BE2D5AED-D2E5-4683-BA53-CE031DFD36F7}" type="datetime1">
               <a:rPr lang="de-CH" smtClean="0"/>
-              <a:t>20.02.2022</a:t>
+              <a:t>08.08.2022</a:t>
             </a:fld>
             <a:endParaRPr lang="fr-CH" dirty="0"/>
           </a:p>
@@ -3243,7 +3243,7 @@
           <a:p>
             <a:fld id="{2901940B-835C-4E14-9765-B00BA93465B8}" type="datetime1">
               <a:rPr lang="de-CH" smtClean="0"/>
-              <a:t>20.02.2022</a:t>
+              <a:t>08.08.2022</a:t>
             </a:fld>
             <a:endParaRPr lang="fr-CH" dirty="0"/>
           </a:p>
@@ -3579,7 +3579,7 @@
           <a:p>
             <a:fld id="{0ED2030C-75A9-4FAF-B3FB-013DBBD37E56}" type="datetime1">
               <a:rPr lang="de-CH" smtClean="0"/>
-              <a:t>20.02.2022</a:t>
+              <a:t>08.08.2022</a:t>
             </a:fld>
             <a:endParaRPr lang="fr-CH" dirty="0"/>
           </a:p>
@@ -4091,7 +4091,7 @@
           <a:p>
             <a:fld id="{771DE1CA-CDE7-4CB5-8FF3-CFA7C49F3DAC}" type="datetime1">
               <a:rPr lang="de-CH" smtClean="0"/>
-              <a:t>20.02.2022</a:t>
+              <a:t>08.08.2022</a:t>
             </a:fld>
             <a:endParaRPr lang="fr-CH" dirty="0"/>
           </a:p>
@@ -4313,7 +4313,7 @@
           <a:p>
             <a:fld id="{610489CE-FBB6-480E-B489-CE91A0A4A37D}" type="datetime1">
               <a:rPr lang="de-CH" smtClean="0"/>
-              <a:t>20.02.2022</a:t>
+              <a:t>08.08.2022</a:t>
             </a:fld>
             <a:endParaRPr lang="fr-CH" dirty="0"/>
           </a:p>
@@ -4491,7 +4491,7 @@
           <a:p>
             <a:fld id="{647C40AA-CA50-40CE-9CC4-07C3161D2D94}" type="datetime1">
               <a:rPr lang="de-CH" smtClean="0"/>
-              <a:t>20.02.2022</a:t>
+              <a:t>08.08.2022</a:t>
             </a:fld>
             <a:endParaRPr lang="fr-CH" dirty="0"/>
           </a:p>
@@ -4750,7 +4750,7 @@
           <a:p>
             <a:fld id="{97951D55-766C-4073-B6D6-F844DD2AD6BD}" type="datetime1">
               <a:rPr lang="de-CH" smtClean="0"/>
-              <a:t>20.02.2022</a:t>
+              <a:t>08.08.2022</a:t>
             </a:fld>
             <a:endParaRPr lang="fr-CH" dirty="0"/>
           </a:p>
@@ -4898,7 +4898,7 @@
           <a:p>
             <a:fld id="{A494620C-7B72-43D0-9AB8-7532B2719D4E}" type="datetime1">
               <a:rPr lang="de-CH" smtClean="0"/>
-              <a:t>20.02.2022</a:t>
+              <a:t>08.08.2022</a:t>
             </a:fld>
             <a:endParaRPr lang="fr-CH" dirty="0"/>
           </a:p>
@@ -5040,7 +5040,7 @@
           <a:p>
             <a:fld id="{0C485A22-3884-4195-8C09-C1ADD9DB16DA}" type="datetime1">
               <a:rPr lang="de-CH" smtClean="0"/>
-              <a:t>20.02.2022</a:t>
+              <a:t>08.08.2022</a:t>
             </a:fld>
             <a:endParaRPr lang="fr-CH" dirty="0"/>
           </a:p>
@@ -5281,7 +5281,7 @@
           <a:p>
             <a:fld id="{E81CF062-5697-4CAB-A913-E646257F8F9E}" type="datetime1">
               <a:rPr lang="de-CH" smtClean="0"/>
-              <a:t>20.02.2022</a:t>
+              <a:t>08.08.2022</a:t>
             </a:fld>
             <a:endParaRPr lang="fr-CH" dirty="0"/>
           </a:p>
@@ -5657,7 +5657,7 @@
           <a:p>
             <a:fld id="{78FE72B2-31B8-4ABB-B926-99823DABB20B}" type="datetime1">
               <a:rPr lang="de-CH" smtClean="0"/>
-              <a:t>20.02.2022</a:t>
+              <a:t>08.08.2022</a:t>
             </a:fld>
             <a:endParaRPr lang="fr-CH" dirty="0"/>
           </a:p>
@@ -5902,7 +5902,7 @@
           <a:p>
             <a:fld id="{9B14CB66-76A4-4740-A994-08456E8DCAEB}" type="datetime1">
               <a:rPr lang="de-CH" smtClean="0"/>
-              <a:t>20.02.2022</a:t>
+              <a:t>08.08.2022</a:t>
             </a:fld>
             <a:endParaRPr lang="fr-CH" dirty="0"/>
           </a:p>
@@ -6171,7 +6171,7 @@
           <a:p>
             <a:fld id="{1DD2F9DE-E085-465A-AFCD-9143BC0CE701}" type="datetime1">
               <a:rPr lang="de-CH" smtClean="0"/>
-              <a:t>20.02.2022</a:t>
+              <a:t>08.08.2022</a:t>
             </a:fld>
             <a:endParaRPr lang="fr-CH" dirty="0"/>
           </a:p>
@@ -6402,7 +6402,7 @@
           <a:p>
             <a:fld id="{DE81F515-B529-4E53-B041-9174A301693D}" type="datetime1">
               <a:rPr lang="de-CH" smtClean="0"/>
-              <a:t>20.02.2022</a:t>
+              <a:t>08.08.2022</a:t>
             </a:fld>
             <a:endParaRPr lang="fr-CH" dirty="0"/>
           </a:p>
@@ -6679,7 +6679,7 @@
           <a:p>
             <a:fld id="{6766DAFF-4DD6-4136-BB56-356AC4CE71A7}" type="datetime1">
               <a:rPr lang="de-CH" smtClean="0"/>
-              <a:t>20.02.2022</a:t>
+              <a:t>08.08.2022</a:t>
             </a:fld>
             <a:endParaRPr lang="fr-CH" dirty="0"/>
           </a:p>
@@ -6936,7 +6936,7 @@
           <a:p>
             <a:fld id="{86B5E76D-0E3A-401B-B7FA-66C67C98CFE9}" type="datetime1">
               <a:rPr lang="de-CH" smtClean="0"/>
-              <a:t>20.02.2022</a:t>
+              <a:t>08.08.2022</a:t>
             </a:fld>
             <a:endParaRPr lang="fr-CH" dirty="0"/>
           </a:p>
@@ -7137,7 +7137,7 @@
           <a:p>
             <a:fld id="{EEAB6B76-9E8E-4349-8B67-30BA00A05EA6}" type="datetime1">
               <a:rPr lang="de-CH" smtClean="0"/>
-              <a:t>20.02.2022</a:t>
+              <a:t>08.08.2022</a:t>
             </a:fld>
             <a:endParaRPr lang="fr-CH" dirty="0"/>
           </a:p>
@@ -7402,7 +7402,7 @@
           <a:p>
             <a:fld id="{01FAA826-5F5E-4E1E-AAE4-E43658568A6E}" type="datetime1">
               <a:rPr lang="de-CH" smtClean="0"/>
-              <a:t>20.02.2022</a:t>
+              <a:t>08.08.2022</a:t>
             </a:fld>
             <a:endParaRPr lang="fr-CH" dirty="0"/>
           </a:p>
@@ -8110,10 +8110,7 @@
               <a:rPr lang="fr-CH" dirty="0" err="1"/>
               <a:t>Functions</a:t>
             </a:r>
-            <a:r>
-              <a:rPr lang="fr-CH" dirty="0"/>
-              <a:t> are the Basis of R</a:t>
-            </a:r>
+            <a:endParaRPr lang="fr-CH" dirty="0"/>
           </a:p>
         </p:txBody>
       </p:sp>
@@ -8134,7 +8131,7 @@
           <a:p>
             <a:fld id="{9968C99E-1E27-4D09-BCD4-A3391F8E8EE9}" type="datetime1">
               <a:rPr lang="de-CH" smtClean="0"/>
-              <a:t>20.02.2022</a:t>
+              <a:t>08.08.2022</a:t>
             </a:fld>
             <a:endParaRPr lang="fr-CH" dirty="0"/>
           </a:p>
@@ -8204,13 +8201,129 @@
         </p:nvSpPr>
         <p:spPr>
           <a:xfrm>
-            <a:off x="695400" y="1115053"/>
-            <a:ext cx="6777212" cy="1152128"/>
+            <a:off x="767408" y="1114471"/>
+            <a:ext cx="7056784" cy="1377843"/>
           </a:xfrm>
         </p:spPr>
         <p:txBody>
-          <a:bodyPr/>
+          <a:bodyPr>
+            <a:normAutofit fontScale="92500" lnSpcReduction="20000"/>
+          </a:bodyPr>
           <a:lstStyle/>
+          <a:p>
+            <a:r>
+              <a:rPr lang="de-CH" dirty="0"/>
+              <a:t>In R, </a:t>
+            </a:r>
+            <a:r>
+              <a:rPr lang="de-CH" dirty="0" err="1"/>
+              <a:t>everything</a:t>
+            </a:r>
+            <a:r>
+              <a:rPr lang="de-CH" dirty="0"/>
+              <a:t> </a:t>
+            </a:r>
+            <a:r>
+              <a:rPr lang="de-CH" dirty="0" err="1"/>
+              <a:t>is</a:t>
+            </a:r>
+            <a:r>
+              <a:rPr lang="de-CH" dirty="0"/>
+              <a:t> an </a:t>
+            </a:r>
+            <a:r>
+              <a:rPr lang="de-CH" dirty="0" err="1"/>
+              <a:t>object</a:t>
+            </a:r>
+            <a:endParaRPr lang="de-CH" dirty="0"/>
+          </a:p>
+          <a:p>
+            <a:r>
+              <a:rPr lang="de-CH" dirty="0"/>
+              <a:t>Most </a:t>
+            </a:r>
+            <a:r>
+              <a:rPr lang="de-CH" dirty="0" err="1"/>
+              <a:t>objects</a:t>
+            </a:r>
+            <a:r>
+              <a:rPr lang="de-CH" dirty="0"/>
+              <a:t> </a:t>
+            </a:r>
+            <a:r>
+              <a:rPr lang="de-CH" dirty="0" err="1"/>
+              <a:t>are</a:t>
+            </a:r>
+            <a:r>
+              <a:rPr lang="de-CH" dirty="0"/>
+              <a:t> </a:t>
+            </a:r>
+            <a:r>
+              <a:rPr lang="de-CH" dirty="0" err="1"/>
+              <a:t>functions</a:t>
+            </a:r>
+            <a:r>
+              <a:rPr lang="de-CH" dirty="0"/>
+              <a:t> </a:t>
+            </a:r>
+            <a:r>
+              <a:rPr lang="de-CH" dirty="0">
+                <a:solidFill>
+                  <a:srgbClr val="C00000"/>
+                </a:solidFill>
+              </a:rPr>
+              <a:t>(</a:t>
+            </a:r>
+            <a:r>
+              <a:rPr lang="de-CH" dirty="0" err="1">
+                <a:solidFill>
+                  <a:srgbClr val="C00000"/>
+                </a:solidFill>
+              </a:rPr>
+              <a:t>demo</a:t>
+            </a:r>
+            <a:r>
+              <a:rPr lang="de-CH" dirty="0">
+                <a:solidFill>
+                  <a:srgbClr val="C00000"/>
+                </a:solidFill>
+              </a:rPr>
+              <a:t>: </a:t>
+            </a:r>
+            <a:r>
+              <a:rPr lang="de-CH" dirty="0" err="1">
+                <a:solidFill>
+                  <a:srgbClr val="C00000"/>
+                </a:solidFill>
+              </a:rPr>
+              <a:t>t.test</a:t>
+            </a:r>
+            <a:r>
+              <a:rPr lang="de-CH" dirty="0">
+                <a:solidFill>
+                  <a:srgbClr val="C00000"/>
+                </a:solidFill>
+              </a:rPr>
+              <a:t>; +; </a:t>
+            </a:r>
+            <a:r>
+              <a:rPr lang="de-CH" dirty="0" err="1">
+                <a:solidFill>
+                  <a:srgbClr val="C00000"/>
+                </a:solidFill>
+              </a:rPr>
+              <a:t>parenthesis</a:t>
+            </a:r>
+            <a:r>
+              <a:rPr lang="de-CH">
+                <a:solidFill>
+                  <a:srgbClr val="C00000"/>
+                </a:solidFill>
+              </a:rPr>
+              <a:t>, …)</a:t>
+            </a:r>
+            <a:endParaRPr lang="de-CH" dirty="0"/>
+          </a:p>
           <a:p>
             <a:r>
               <a:rPr lang="de-CH" dirty="0"/>
@@ -8243,34 +8356,6 @@
             <a:r>
               <a:rPr lang="de-CH" dirty="0" err="1"/>
               <a:t>functions</a:t>
-            </a:r>
-            <a:r>
-              <a:rPr lang="de-CH" dirty="0"/>
-              <a:t> </a:t>
-            </a:r>
-            <a:r>
-              <a:rPr lang="de-CH" dirty="0">
-                <a:solidFill>
-                  <a:srgbClr val="C00000"/>
-                </a:solidFill>
-              </a:rPr>
-              <a:t>(</a:t>
-            </a:r>
-            <a:r>
-              <a:rPr lang="de-CH" dirty="0" err="1">
-                <a:solidFill>
-                  <a:srgbClr val="C00000"/>
-                </a:solidFill>
-              </a:rPr>
-              <a:t>demo</a:t>
-            </a:r>
-            <a:r>
-              <a:rPr lang="de-CH" dirty="0">
-                <a:solidFill>
-                  <a:srgbClr val="C00000"/>
-                </a:solidFill>
-              </a:rPr>
-              <a:t> in R)</a:t>
             </a:r>
             <a:endParaRPr lang="de-CH" dirty="0"/>
           </a:p>
@@ -9244,7 +9329,7 @@
           <a:p>
             <a:fld id="{4C38BF51-FD12-4780-9282-8B4B82423C53}" type="datetime1">
               <a:rPr lang="de-CH" smtClean="0"/>
-              <a:t>20.02.2022</a:t>
+              <a:t>08.08.2022</a:t>
             </a:fld>
             <a:endParaRPr lang="fr-CH" dirty="0"/>
           </a:p>
@@ -10012,8 +10097,25 @@
                 <a:latin typeface="Courier New" panose="02070309020205020404" pitchFamily="49" charset="0"/>
                 <a:cs typeface="Courier New" panose="02070309020205020404" pitchFamily="49" charset="0"/>
               </a:rPr>
-              <a:t> cool</a:t>
-            </a:r>
+              <a:t> </a:t>
+            </a:r>
+            <a:r>
+              <a:rPr lang="de-CH" b="1" dirty="0" err="1">
+                <a:solidFill>
+                  <a:schemeClr val="tx2"/>
+                </a:solidFill>
+                <a:latin typeface="Courier New" panose="02070309020205020404" pitchFamily="49" charset="0"/>
+                <a:cs typeface="Courier New" panose="02070309020205020404" pitchFamily="49" charset="0"/>
+              </a:rPr>
+              <a:t>fancy</a:t>
+            </a:r>
+            <a:endParaRPr lang="de-CH" b="1" dirty="0">
+              <a:solidFill>
+                <a:schemeClr val="tx2"/>
+              </a:solidFill>
+              <a:latin typeface="Courier New" panose="02070309020205020404" pitchFamily="49" charset="0"/>
+              <a:cs typeface="Courier New" panose="02070309020205020404" pitchFamily="49" charset="0"/>
+            </a:endParaRPr>
           </a:p>
           <a:p>
             <a:pPr marL="0" indent="0">
@@ -10024,7 +10126,7 @@
                 <a:latin typeface="Courier New" panose="02070309020205020404" pitchFamily="49" charset="0"/>
                 <a:cs typeface="Courier New" panose="02070309020205020404" pitchFamily="49" charset="0"/>
               </a:rPr>
-              <a:t>something_cool</a:t>
+              <a:t>something_fancy</a:t>
             </a:r>
             <a:r>
               <a:rPr lang="de-CH" dirty="0">
@@ -10148,7 +10250,7 @@
           <a:p>
             <a:fld id="{76AA5BC4-8BF6-4DDD-B3E1-1D2BF7222D22}" type="datetime1">
               <a:rPr lang="de-CH" smtClean="0"/>
-              <a:t>20.02.2022</a:t>
+              <a:t>08.08.2022</a:t>
             </a:fld>
             <a:endParaRPr lang="fr-CH" dirty="0"/>
           </a:p>
@@ -11905,7 +12007,7 @@
           <a:p>
             <a:fld id="{1AB4C5C6-AF87-45AC-AA88-6A0A0087A591}" type="datetime1">
               <a:rPr lang="de-CH" smtClean="0"/>
-              <a:t>20.02.2022</a:t>
+              <a:t>08.08.2022</a:t>
             </a:fld>
             <a:endParaRPr lang="fr-CH" dirty="0"/>
           </a:p>
@@ -12311,7 +12413,7 @@
             </a:r>
             <a:r>
               <a:rPr lang="de-CH" dirty="0"/>
-              <a:t> CRAN)</a:t>
+              <a:t> CRAN).</a:t>
             </a:r>
           </a:p>
           <a:p>
@@ -12861,7 +12963,7 @@
           <a:p>
             <a:fld id="{F3F6CB59-E58D-41F2-8112-AD0E20BFAE57}" type="datetime1">
               <a:rPr lang="de-CH" smtClean="0"/>
-              <a:t>20.02.2022</a:t>
+              <a:t>08.08.2022</a:t>
             </a:fld>
             <a:endParaRPr lang="fr-CH" dirty="0"/>
           </a:p>
@@ -12932,7 +13034,7 @@
         <p:spPr>
           <a:xfrm>
             <a:off x="2063552" y="1412776"/>
-            <a:ext cx="7209260" cy="4376288"/>
+            <a:ext cx="7209260" cy="4824536"/>
           </a:xfrm>
         </p:spPr>
         <p:txBody>
@@ -13592,6 +13694,62 @@
               </a:rPr>
               <a:t>me  # or print(me)</a:t>
             </a:r>
+          </a:p>
+          <a:p>
+            <a:pPr marL="0" indent="0">
+              <a:buNone/>
+            </a:pPr>
+            <a:endParaRPr lang="en-US" sz="1400" dirty="0">
+              <a:latin typeface="Courier New" panose="02070309020205020404" pitchFamily="49" charset="0"/>
+              <a:cs typeface="Courier New" panose="02070309020205020404" pitchFamily="49" charset="0"/>
+            </a:endParaRPr>
+          </a:p>
+          <a:p>
+            <a:pPr marL="0" indent="0">
+              <a:buNone/>
+            </a:pPr>
+            <a:r>
+              <a:rPr lang="de-CH" dirty="0" err="1">
+                <a:solidFill>
+                  <a:schemeClr val="tx2"/>
+                </a:solidFill>
+                <a:cs typeface="Courier New" panose="02070309020205020404" pitchFamily="49" charset="0"/>
+              </a:rPr>
+              <a:t>Example</a:t>
+            </a:r>
+            <a:r>
+              <a:rPr lang="de-CH" dirty="0">
+                <a:solidFill>
+                  <a:schemeClr val="tx2"/>
+                </a:solidFill>
+                <a:cs typeface="Courier New" panose="02070309020205020404" pitchFamily="49" charset="0"/>
+              </a:rPr>
+              <a:t> 3: </a:t>
+            </a:r>
+            <a:r>
+              <a:rPr lang="de-CH" dirty="0" err="1">
+                <a:solidFill>
+                  <a:schemeClr val="tx2"/>
+                </a:solidFill>
+                <a:cs typeface="Courier New" panose="02070309020205020404" pitchFamily="49" charset="0"/>
+              </a:rPr>
+              <a:t>t.test</a:t>
+            </a:r>
+            <a:r>
+              <a:rPr lang="de-CH" dirty="0">
+                <a:solidFill>
+                  <a:schemeClr val="tx2"/>
+                </a:solidFill>
+                <a:cs typeface="Courier New" panose="02070309020205020404" pitchFamily="49" charset="0"/>
+              </a:rPr>
+              <a:t>()</a:t>
+            </a:r>
+            <a:endParaRPr lang="en-US" dirty="0">
+              <a:solidFill>
+                <a:schemeClr val="tx2"/>
+              </a:solidFill>
+              <a:cs typeface="Courier New" panose="02070309020205020404" pitchFamily="49" charset="0"/>
+            </a:endParaRPr>
           </a:p>
           <a:p>
             <a:pPr marL="0" indent="0">
@@ -13687,7 +13845,7 @@
           <a:p>
             <a:fld id="{5BFE5645-FFB5-47FD-B669-EE82B30CEDEC}" type="datetime1">
               <a:rPr lang="de-CH" smtClean="0"/>
-              <a:t>20.02.2022</a:t>
+              <a:t>08.08.2022</a:t>
             </a:fld>
             <a:endParaRPr lang="fr-CH" dirty="0"/>
           </a:p>
@@ -14517,7 +14675,7 @@
           <a:p>
             <a:fld id="{AC5354E2-64B9-4772-9397-C2841773751B}" type="datetime1">
               <a:rPr lang="de-CH" smtClean="0"/>
-              <a:t>20.02.2022</a:t>
+              <a:t>08.08.2022</a:t>
             </a:fld>
             <a:endParaRPr lang="fr-CH" dirty="0"/>
           </a:p>
@@ -14625,14 +14783,6 @@
             <a:r>
               <a:rPr lang="de-CH" dirty="0" err="1"/>
               <a:t>never</a:t>
-            </a:r>
-            <a:r>
-              <a:rPr lang="de-CH" dirty="0"/>
-              <a:t> </a:t>
-            </a:r>
-            <a:r>
-              <a:rPr lang="de-CH" dirty="0" err="1"/>
-              <a:t>ever</a:t>
             </a:r>
             <a:r>
               <a:rPr lang="de-CH" dirty="0"/>

</xml_diff>